<commit_message>
added timelog file to repo
</commit_message>
<xml_diff>
--- a/presentation/week 5 Meeting.pptx
+++ b/presentation/week 5 Meeting.pptx
@@ -116,16 +116,32 @@
 </p:presentation>
 </file>
 
-<file path=ppt/revisionInfo.xml><?xml version="1.0" encoding="utf-8"?>
-<p1510:revInfo xmlns:a="http://schemas.openxmlformats.org/drawingml/2006/main" xmlns:r="http://schemas.openxmlformats.org/officeDocument/2006/relationships" xmlns:p1510="http://schemas.microsoft.com/office/powerpoint/2015/10/main">
-  <p1510:revLst>
-    <p1510:client id="{9F12236D-3EA8-4A9F-82C3-6963263D7FDC}" v="3" dt="2021-10-31T23:09:15.658"/>
-  </p1510:revLst>
-</p1510:revInfo>
-</file>
-
 <file path=ppt/changesInfos/changesInfo1.xml><?xml version="1.0" encoding="utf-8"?>
 <pc:chgInfo xmlns:a="http://schemas.openxmlformats.org/drawingml/2006/main" xmlns:r="http://schemas.openxmlformats.org/officeDocument/2006/relationships" xmlns:ac="http://schemas.microsoft.com/office/drawing/2013/main/command" xmlns:pc="http://schemas.microsoft.com/office/powerpoint/2013/main/command">
+  <pc:docChgLst>
+    <pc:chgData name="toby lee" userId="c2b0b406bfa6151f" providerId="LiveId" clId="{A51E659E-EEDF-4E31-863D-7B596F3E0BF4}"/>
+    <pc:docChg chg="modSld">
+      <pc:chgData name="toby lee" userId="c2b0b406bfa6151f" providerId="LiveId" clId="{A51E659E-EEDF-4E31-863D-7B596F3E0BF4}" dt="2021-12-11T21:22:10.997" v="3" actId="20577"/>
+      <pc:docMkLst>
+        <pc:docMk/>
+      </pc:docMkLst>
+      <pc:sldChg chg="modSp mod">
+        <pc:chgData name="toby lee" userId="c2b0b406bfa6151f" providerId="LiveId" clId="{A51E659E-EEDF-4E31-863D-7B596F3E0BF4}" dt="2021-12-11T21:22:10.997" v="3" actId="20577"/>
+        <pc:sldMkLst>
+          <pc:docMk/>
+          <pc:sldMk cId="3956411206" sldId="256"/>
+        </pc:sldMkLst>
+        <pc:spChg chg="mod">
+          <ac:chgData name="toby lee" userId="c2b0b406bfa6151f" providerId="LiveId" clId="{A51E659E-EEDF-4E31-863D-7B596F3E0BF4}" dt="2021-12-11T21:22:10.997" v="3" actId="20577"/>
+          <ac:spMkLst>
+            <pc:docMk/>
+            <pc:sldMk cId="3956411206" sldId="256"/>
+            <ac:spMk id="3" creationId="{29796D7D-3175-4BB8-9B63-55C81B20C750}"/>
+          </ac:spMkLst>
+        </pc:spChg>
+      </pc:sldChg>
+    </pc:docChg>
+  </pc:docChgLst>
   <pc:docChgLst>
     <pc:chgData name="toby lee" userId="c2b0b406bfa6151f" providerId="LiveId" clId="{9F12236D-3EA8-4A9F-82C3-6963263D7FDC}"/>
     <pc:docChg chg="undo custSel addSld delSld modSld">
@@ -659,7 +675,7 @@
           <a:p>
             <a:fld id="{ED291B17-9318-49DB-B28B-6E5994AE9581}" type="datetime1">
               <a:rPr lang="en-US" smtClean="0"/>
-              <a:t>10/31/2021</a:t>
+              <a:t>12/11/2021</a:t>
             </a:fld>
             <a:endParaRPr lang="en-US" dirty="0"/>
           </a:p>
@@ -862,7 +878,7 @@
           <a:p>
             <a:fld id="{2CED4963-E985-44C4-B8C4-FDD613B7C2F8}" type="datetime1">
               <a:rPr lang="en-US" smtClean="0"/>
-              <a:t>10/31/2021</a:t>
+              <a:t>12/11/2021</a:t>
             </a:fld>
             <a:endParaRPr lang="en-US" dirty="0"/>
           </a:p>
@@ -1224,7 +1240,7 @@
           <a:p>
             <a:fld id="{ED291B17-9318-49DB-B28B-6E5994AE9581}" type="datetime1">
               <a:rPr lang="en-US" smtClean="0"/>
-              <a:t>10/31/2021</a:t>
+              <a:t>12/11/2021</a:t>
             </a:fld>
             <a:endParaRPr lang="en-US" dirty="0"/>
           </a:p>
@@ -1422,7 +1438,7 @@
           <a:p>
             <a:fld id="{78DD82B9-B8EE-4375-B6FF-88FA6ABB15D9}" type="datetime1">
               <a:rPr lang="en-US" smtClean="0"/>
-              <a:t>10/31/2021</a:t>
+              <a:t>12/11/2021</a:t>
             </a:fld>
             <a:endParaRPr lang="en-US" dirty="0"/>
           </a:p>
@@ -1734,7 +1750,7 @@
           <a:p>
             <a:fld id="{B2497495-0637-405E-AE64-5CC7506D51F5}" type="datetime1">
               <a:rPr lang="en-US" smtClean="0"/>
-              <a:t>10/31/2021</a:t>
+              <a:t>12/11/2021</a:t>
             </a:fld>
             <a:endParaRPr lang="en-US" dirty="0"/>
           </a:p>
@@ -1987,7 +2003,7 @@
           <a:p>
             <a:fld id="{7BFFD690-9426-415D-8B65-26881E07B2D4}" type="datetime1">
               <a:rPr lang="en-US" smtClean="0"/>
-              <a:t>10/31/2021</a:t>
+              <a:t>12/11/2021</a:t>
             </a:fld>
             <a:endParaRPr lang="en-US" dirty="0"/>
           </a:p>
@@ -2409,7 +2425,7 @@
           <a:p>
             <a:fld id="{04C4989A-474C-40DE-95B9-011C28B71673}" type="datetime1">
               <a:rPr lang="en-US" smtClean="0"/>
-              <a:t>10/31/2021</a:t>
+              <a:t>12/11/2021</a:t>
             </a:fld>
             <a:endParaRPr lang="en-US" dirty="0"/>
           </a:p>
@@ -2532,7 +2548,7 @@
           <a:p>
             <a:fld id="{5DB4ED54-5B5E-4A04-93D3-5772E3CE3818}" type="datetime1">
               <a:rPr lang="en-US" smtClean="0"/>
-              <a:t>10/31/2021</a:t>
+              <a:t>12/11/2021</a:t>
             </a:fld>
             <a:endParaRPr lang="en-US" dirty="0"/>
           </a:p>
@@ -2627,7 +2643,7 @@
           <a:p>
             <a:fld id="{4EDE50D6-574B-40AF-946F-D52A04ADE379}" type="datetime1">
               <a:rPr lang="en-US" smtClean="0"/>
-              <a:t>10/31/2021</a:t>
+              <a:t>12/11/2021</a:t>
             </a:fld>
             <a:endParaRPr lang="en-US" dirty="0"/>
           </a:p>
@@ -3004,7 +3020,7 @@
           <a:p>
             <a:fld id="{D82884F1-FFEA-405F-9602-3DCA865EDA4E}" type="datetime1">
               <a:rPr lang="en-US" smtClean="0"/>
-              <a:t>10/31/2021</a:t>
+              <a:t>12/11/2021</a:t>
             </a:fld>
             <a:endParaRPr lang="en-US" dirty="0"/>
           </a:p>
@@ -3297,7 +3313,7 @@
           <a:p>
             <a:fld id="{7E18DB4A-8810-4A10-AD5C-D5E2C667F5B3}" type="datetime1">
               <a:rPr lang="en-US" smtClean="0"/>
-              <a:t>10/31/2021</a:t>
+              <a:t>12/11/2021</a:t>
             </a:fld>
             <a:endParaRPr lang="en-US" dirty="0"/>
           </a:p>
@@ -3512,7 +3528,7 @@
           <a:p>
             <a:fld id="{ED291B17-9318-49DB-B28B-6E5994AE9581}" type="datetime1">
               <a:rPr lang="en-US" smtClean="0"/>
-              <a:t>10/31/2021</a:t>
+              <a:t>12/11/2021</a:t>
             </a:fld>
             <a:endParaRPr lang="en-US" dirty="0"/>
           </a:p>
@@ -4432,8 +4448,12 @@
           <a:lstStyle/>
           <a:p>
             <a:r>
+              <a:rPr lang="en-GB"/>
+              <a:t>Week 5 </a:t>
+            </a:r>
+            <a:r>
               <a:rPr lang="en-GB" dirty="0"/>
-              <a:t>Week 5 Meeting, 1/11/2021</a:t>
+              <a:t>Meeting, 1/11/2021</a:t>
             </a:r>
             <a:endParaRPr lang="en-US" dirty="0"/>
           </a:p>

</xml_diff>